<commit_message>
week 10 - update
</commit_message>
<xml_diff>
--- a/course slides/week_10.pptx
+++ b/course slides/week_10.pptx
@@ -12,7 +12,7 @@
     <p:sldId id="273" r:id="rId3"/>
     <p:sldId id="287" r:id="rId4"/>
     <p:sldId id="285" r:id="rId5"/>
-    <p:sldId id="288" r:id="rId6"/>
+    <p:sldId id="290" r:id="rId6"/>
     <p:sldId id="289" r:id="rId7"/>
     <p:sldId id="284" r:id="rId8"/>
   </p:sldIdLst>
@@ -1092,6 +1092,129 @@
           <a:bodyPr/>
           <a:lstStyle/>
           <a:p>
+            <a:r>
+              <a:rPr lang="en-US" dirty="0"/>
+              <a:t>Similar to MLP, but uses convolution layers</a:t>
+            </a:r>
+          </a:p>
+          <a:p>
+            <a:endParaRPr lang="en-US" dirty="0"/>
+          </a:p>
+          <a:p>
+            <a:r>
+              <a:rPr lang="en-US" sz="1200" b="0" i="0" u="none" strike="noStrike" kern="1200" dirty="0">
+                <a:solidFill>
+                  <a:schemeClr val="tx1"/>
+                </a:solidFill>
+                <a:effectLst/>
+                <a:latin typeface="+mn-lt"/>
+                <a:ea typeface="+mn-ea"/>
+                <a:cs typeface="+mn-cs"/>
+              </a:rPr>
+              <a:t>The filter is moved across the grid and produces new values. These new values can represent edges or lines in the image.</a:t>
+            </a:r>
+          </a:p>
+          <a:p>
+            <a:endParaRPr lang="en-US" sz="1200" b="0" i="0" u="none" strike="noStrike" kern="1200" dirty="0">
+              <a:solidFill>
+                <a:schemeClr val="tx1"/>
+              </a:solidFill>
+              <a:effectLst/>
+              <a:latin typeface="+mn-lt"/>
+              <a:ea typeface="+mn-ea"/>
+              <a:cs typeface="+mn-cs"/>
+            </a:endParaRPr>
+          </a:p>
+          <a:p>
+            <a:endParaRPr lang="en-US" sz="1200" b="0" i="0" u="none" strike="noStrike" kern="1200" dirty="0">
+              <a:solidFill>
+                <a:schemeClr val="tx1"/>
+              </a:solidFill>
+              <a:effectLst/>
+              <a:latin typeface="+mn-lt"/>
+              <a:ea typeface="+mn-ea"/>
+              <a:cs typeface="+mn-cs"/>
+            </a:endParaRPr>
+          </a:p>
+          <a:p>
+            <a:r>
+              <a:rPr lang="en-US" sz="1200" b="0" i="0" u="none" strike="noStrike" kern="1200" dirty="0">
+                <a:solidFill>
+                  <a:schemeClr val="tx1"/>
+                </a:solidFill>
+                <a:effectLst/>
+                <a:latin typeface="+mn-lt"/>
+                <a:ea typeface="+mn-ea"/>
+                <a:cs typeface="+mn-cs"/>
+              </a:rPr>
+              <a:t>Pooling layers do what they sound like. They “pool” together the most important characteristics found by the filters. This is done by using multiple methods. One popular method is Max Pooling, where for each filtered part of an image, the largest number is taken and stored into a new grid</a:t>
+            </a:r>
+          </a:p>
+          <a:p>
+            <a:endParaRPr lang="en-US" sz="1200" b="0" i="0" u="none" strike="noStrike" kern="1200" dirty="0">
+              <a:solidFill>
+                <a:schemeClr val="tx1"/>
+              </a:solidFill>
+              <a:effectLst/>
+              <a:latin typeface="+mn-lt"/>
+              <a:ea typeface="+mn-ea"/>
+              <a:cs typeface="+mn-cs"/>
+            </a:endParaRPr>
+          </a:p>
+          <a:p>
+            <a:endParaRPr lang="en-US" sz="1200" b="0" i="0" u="none" strike="noStrike" kern="1200" dirty="0">
+              <a:solidFill>
+                <a:schemeClr val="tx1"/>
+              </a:solidFill>
+              <a:effectLst/>
+              <a:latin typeface="+mn-lt"/>
+              <a:ea typeface="+mn-ea"/>
+              <a:cs typeface="+mn-cs"/>
+            </a:endParaRPr>
+          </a:p>
+          <a:p>
+            <a:pPr marL="0" marR="0" lvl="0" indent="0" algn="l" defTabSz="914400" rtl="0" eaLnBrk="1" fontAlgn="auto" latinLnBrk="0" hangingPunct="1">
+              <a:lnSpc>
+                <a:spcPct val="100000"/>
+              </a:lnSpc>
+              <a:spcBef>
+                <a:spcPts val="0"/>
+              </a:spcBef>
+              <a:spcAft>
+                <a:spcPts val="0"/>
+              </a:spcAft>
+              <a:buClrTx/>
+              <a:buSzTx/>
+              <a:buFontTx/>
+              <a:buNone/>
+              <a:tabLst/>
+              <a:defRPr/>
+            </a:pPr>
+            <a:r>
+              <a:rPr lang="en-US" dirty="0"/>
+              <a:t>Fully connected vs conv for </a:t>
+            </a:r>
+            <a:r>
+              <a:rPr lang="en-US" dirty="0" err="1"/>
+              <a:t>mnists</a:t>
+            </a:r>
+            <a:r>
+              <a:rPr lang="en-US" dirty="0"/>
+              <a:t> dataset</a:t>
+            </a:r>
+          </a:p>
+          <a:p>
+            <a:endParaRPr lang="en-US" sz="1200" b="0" i="0" u="none" strike="noStrike" kern="1200" dirty="0">
+              <a:solidFill>
+                <a:schemeClr val="tx1"/>
+              </a:solidFill>
+              <a:effectLst/>
+              <a:latin typeface="+mn-lt"/>
+              <a:ea typeface="+mn-ea"/>
+              <a:cs typeface="+mn-cs"/>
+            </a:endParaRPr>
+          </a:p>
+          <a:p>
             <a:endParaRPr lang="en-US" dirty="0"/>
           </a:p>
         </p:txBody>
@@ -1176,6 +1299,129 @@
           <a:bodyPr/>
           <a:lstStyle/>
           <a:p>
+            <a:r>
+              <a:rPr lang="en-US" dirty="0"/>
+              <a:t>Similar to MLP, but uses convolution layers</a:t>
+            </a:r>
+          </a:p>
+          <a:p>
+            <a:endParaRPr lang="en-US" dirty="0"/>
+          </a:p>
+          <a:p>
+            <a:r>
+              <a:rPr lang="en-US" sz="1200" b="0" i="0" u="none" strike="noStrike" kern="1200" dirty="0">
+                <a:solidFill>
+                  <a:schemeClr val="tx1"/>
+                </a:solidFill>
+                <a:effectLst/>
+                <a:latin typeface="+mn-lt"/>
+                <a:ea typeface="+mn-ea"/>
+                <a:cs typeface="+mn-cs"/>
+              </a:rPr>
+              <a:t>The filter is moved across the grid and produces new values. These new values can represent edges or lines in the image.</a:t>
+            </a:r>
+          </a:p>
+          <a:p>
+            <a:endParaRPr lang="en-US" sz="1200" b="0" i="0" u="none" strike="noStrike" kern="1200" dirty="0">
+              <a:solidFill>
+                <a:schemeClr val="tx1"/>
+              </a:solidFill>
+              <a:effectLst/>
+              <a:latin typeface="+mn-lt"/>
+              <a:ea typeface="+mn-ea"/>
+              <a:cs typeface="+mn-cs"/>
+            </a:endParaRPr>
+          </a:p>
+          <a:p>
+            <a:endParaRPr lang="en-US" sz="1200" b="0" i="0" u="none" strike="noStrike" kern="1200" dirty="0">
+              <a:solidFill>
+                <a:schemeClr val="tx1"/>
+              </a:solidFill>
+              <a:effectLst/>
+              <a:latin typeface="+mn-lt"/>
+              <a:ea typeface="+mn-ea"/>
+              <a:cs typeface="+mn-cs"/>
+            </a:endParaRPr>
+          </a:p>
+          <a:p>
+            <a:r>
+              <a:rPr lang="en-US" sz="1200" b="0" i="0" u="none" strike="noStrike" kern="1200" dirty="0">
+                <a:solidFill>
+                  <a:schemeClr val="tx1"/>
+                </a:solidFill>
+                <a:effectLst/>
+                <a:latin typeface="+mn-lt"/>
+                <a:ea typeface="+mn-ea"/>
+                <a:cs typeface="+mn-cs"/>
+              </a:rPr>
+              <a:t>Pooling layers do what they sound like. They “pool” together the most important characteristics found by the filters. This is done by using multiple methods. One popular method is Max Pooling, where for each filtered part of an image, the largest number is taken and stored into a new grid</a:t>
+            </a:r>
+          </a:p>
+          <a:p>
+            <a:endParaRPr lang="en-US" sz="1200" b="0" i="0" u="none" strike="noStrike" kern="1200" dirty="0">
+              <a:solidFill>
+                <a:schemeClr val="tx1"/>
+              </a:solidFill>
+              <a:effectLst/>
+              <a:latin typeface="+mn-lt"/>
+              <a:ea typeface="+mn-ea"/>
+              <a:cs typeface="+mn-cs"/>
+            </a:endParaRPr>
+          </a:p>
+          <a:p>
+            <a:endParaRPr lang="en-US" sz="1200" b="0" i="0" u="none" strike="noStrike" kern="1200" dirty="0">
+              <a:solidFill>
+                <a:schemeClr val="tx1"/>
+              </a:solidFill>
+              <a:effectLst/>
+              <a:latin typeface="+mn-lt"/>
+              <a:ea typeface="+mn-ea"/>
+              <a:cs typeface="+mn-cs"/>
+            </a:endParaRPr>
+          </a:p>
+          <a:p>
+            <a:pPr marL="0" marR="0" lvl="0" indent="0" algn="l" defTabSz="914400" rtl="0" eaLnBrk="1" fontAlgn="auto" latinLnBrk="0" hangingPunct="1">
+              <a:lnSpc>
+                <a:spcPct val="100000"/>
+              </a:lnSpc>
+              <a:spcBef>
+                <a:spcPts val="0"/>
+              </a:spcBef>
+              <a:spcAft>
+                <a:spcPts val="0"/>
+              </a:spcAft>
+              <a:buClrTx/>
+              <a:buSzTx/>
+              <a:buFontTx/>
+              <a:buNone/>
+              <a:tabLst/>
+              <a:defRPr/>
+            </a:pPr>
+            <a:r>
+              <a:rPr lang="en-US" dirty="0"/>
+              <a:t>Fully connected vs conv for </a:t>
+            </a:r>
+            <a:r>
+              <a:rPr lang="en-US" dirty="0" err="1"/>
+              <a:t>mnists</a:t>
+            </a:r>
+            <a:r>
+              <a:rPr lang="en-US" dirty="0"/>
+              <a:t> dataset</a:t>
+            </a:r>
+          </a:p>
+          <a:p>
+            <a:endParaRPr lang="en-US" sz="1200" b="0" i="0" u="none" strike="noStrike" kern="1200" dirty="0">
+              <a:solidFill>
+                <a:schemeClr val="tx1"/>
+              </a:solidFill>
+              <a:effectLst/>
+              <a:latin typeface="+mn-lt"/>
+              <a:ea typeface="+mn-ea"/>
+              <a:cs typeface="+mn-cs"/>
+            </a:endParaRPr>
+          </a:p>
+          <a:p>
             <a:endParaRPr lang="en-US" dirty="0"/>
           </a:p>
         </p:txBody>
@@ -1206,7 +1452,7 @@
     </p:spTree>
     <p:extLst>
       <p:ext uri="{BB962C8B-B14F-4D97-AF65-F5344CB8AC3E}">
-        <p14:creationId xmlns:p14="http://schemas.microsoft.com/office/powerpoint/2010/main" val="2242180828"/>
+        <p14:creationId xmlns:p14="http://schemas.microsoft.com/office/powerpoint/2010/main" val="1142660490"/>
       </p:ext>
     </p:extLst>
   </p:cSld>
@@ -1260,6 +1506,166 @@
           <a:bodyPr/>
           <a:lstStyle/>
           <a:p>
+            <a:pPr marL="0" marR="0" lvl="0" indent="0" algn="l" defTabSz="914400" rtl="0" eaLnBrk="1" fontAlgn="auto" latinLnBrk="0" hangingPunct="1">
+              <a:lnSpc>
+                <a:spcPct val="100000"/>
+              </a:lnSpc>
+              <a:spcBef>
+                <a:spcPts val="0"/>
+              </a:spcBef>
+              <a:spcAft>
+                <a:spcPts val="0"/>
+              </a:spcAft>
+              <a:buClrTx/>
+              <a:buSzTx/>
+              <a:buFontTx/>
+              <a:buNone/>
+              <a:tabLst/>
+              <a:defRPr/>
+            </a:pPr>
+            <a:r>
+              <a:rPr lang="en-US" dirty="0"/>
+              <a:t>A model developed for a task is reused as the starting point for a model on a second task</a:t>
+            </a:r>
+          </a:p>
+          <a:p>
+            <a:endParaRPr lang="en-US" dirty="0"/>
+          </a:p>
+          <a:p>
+            <a:r>
+              <a:rPr lang="en-US" sz="1200" b="0" i="0" kern="1200" dirty="0">
+                <a:solidFill>
+                  <a:schemeClr val="tx1"/>
+                </a:solidFill>
+                <a:effectLst/>
+                <a:latin typeface="+mn-lt"/>
+                <a:ea typeface="+mn-ea"/>
+                <a:cs typeface="+mn-cs"/>
+              </a:rPr>
+              <a:t>Deep learning models excel at learning from a large number of labeled examples, but typically do not generalize to conditions not seen during training.</a:t>
+            </a:r>
+          </a:p>
+          <a:p>
+            <a:endParaRPr lang="en-US" sz="1200" b="0" i="0" kern="1200" dirty="0">
+              <a:solidFill>
+                <a:schemeClr val="tx1"/>
+              </a:solidFill>
+              <a:effectLst/>
+              <a:latin typeface="+mn-lt"/>
+              <a:ea typeface="+mn-ea"/>
+              <a:cs typeface="+mn-cs"/>
+            </a:endParaRPr>
+          </a:p>
+          <a:p>
+            <a:r>
+              <a:rPr lang="en-US" sz="1200" b="0" i="0" kern="1200" dirty="0">
+                <a:solidFill>
+                  <a:schemeClr val="tx1"/>
+                </a:solidFill>
+                <a:effectLst/>
+                <a:latin typeface="+mn-lt"/>
+                <a:ea typeface="+mn-ea"/>
+                <a:cs typeface="+mn-cs"/>
+              </a:rPr>
+              <a:t>successful models are immensely data-hungry and rely on huge amounts of labeled data to achieve their performance.</a:t>
+            </a:r>
+          </a:p>
+          <a:p>
+            <a:endParaRPr lang="en-US" sz="1200" b="0" i="0" kern="1200" dirty="0">
+              <a:solidFill>
+                <a:schemeClr val="tx1"/>
+              </a:solidFill>
+              <a:effectLst/>
+              <a:latin typeface="+mn-lt"/>
+              <a:ea typeface="+mn-ea"/>
+              <a:cs typeface="+mn-cs"/>
+            </a:endParaRPr>
+          </a:p>
+          <a:p>
+            <a:r>
+              <a:rPr lang="en-US" sz="1200" b="0" i="0" kern="1200" dirty="0">
+                <a:solidFill>
+                  <a:schemeClr val="tx1"/>
+                </a:solidFill>
+                <a:effectLst/>
+                <a:latin typeface="+mn-lt"/>
+                <a:ea typeface="+mn-ea"/>
+                <a:cs typeface="+mn-cs"/>
+              </a:rPr>
+              <a:t>Different scenarios:</a:t>
+            </a:r>
+          </a:p>
+          <a:p>
+            <a:pPr marL="171450" indent="-171450">
+              <a:buFont typeface="Arial" panose="020B0604020202020204" pitchFamily="34" charset="0"/>
+              <a:buChar char="•"/>
+            </a:pPr>
+            <a:r>
+              <a:rPr lang="en-US" sz="1200" b="0" i="0" kern="1200" dirty="0">
+                <a:solidFill>
+                  <a:schemeClr val="tx1"/>
+                </a:solidFill>
+                <a:effectLst/>
+                <a:latin typeface="+mn-lt"/>
+                <a:ea typeface="+mn-ea"/>
+                <a:cs typeface="+mn-cs"/>
+              </a:rPr>
+              <a:t>The feature spaces of the source and target domain are different, e.g. the documents are written in two different languages.</a:t>
+            </a:r>
+          </a:p>
+          <a:p>
+            <a:pPr marL="171450" indent="-171450">
+              <a:buFont typeface="Arial" panose="020B0604020202020204" pitchFamily="34" charset="0"/>
+              <a:buChar char="•"/>
+            </a:pPr>
+            <a:r>
+              <a:rPr lang="en-US" sz="1200" b="0" i="0" kern="1200" dirty="0">
+                <a:solidFill>
+                  <a:schemeClr val="tx1"/>
+                </a:solidFill>
+                <a:effectLst/>
+                <a:latin typeface="+mn-lt"/>
+                <a:ea typeface="+mn-ea"/>
+                <a:cs typeface="+mn-cs"/>
+              </a:rPr>
+              <a:t>The marginal probability distributions of source and target domain are different, e.g. the documents discuss different topics. This scenario is generally known as domain adaptation.</a:t>
+            </a:r>
+          </a:p>
+          <a:p>
+            <a:pPr marL="171450" indent="-171450">
+              <a:buFont typeface="Arial" panose="020B0604020202020204" pitchFamily="34" charset="0"/>
+              <a:buChar char="•"/>
+            </a:pPr>
+            <a:r>
+              <a:rPr lang="en-US" sz="1200" b="0" i="0" kern="1200" dirty="0">
+                <a:solidFill>
+                  <a:schemeClr val="tx1"/>
+                </a:solidFill>
+                <a:effectLst/>
+                <a:latin typeface="+mn-lt"/>
+                <a:ea typeface="+mn-ea"/>
+                <a:cs typeface="+mn-cs"/>
+              </a:rPr>
+              <a:t>The label spaces between the two tasks are different, e.g. documents need to be assigned different labels in the target task. </a:t>
+            </a:r>
+          </a:p>
+          <a:p>
+            <a:pPr marL="171450" indent="-171450">
+              <a:buFont typeface="Arial" panose="020B0604020202020204" pitchFamily="34" charset="0"/>
+              <a:buChar char="•"/>
+            </a:pPr>
+            <a:r>
+              <a:rPr lang="en-US" sz="1200" b="0" i="0" kern="1200" dirty="0">
+                <a:solidFill>
+                  <a:schemeClr val="tx1"/>
+                </a:solidFill>
+                <a:effectLst/>
+                <a:latin typeface="+mn-lt"/>
+                <a:ea typeface="+mn-ea"/>
+                <a:cs typeface="+mn-cs"/>
+              </a:rPr>
+              <a:t>he conditional probability distributions of the source and target tasks are different, e.g. source and target documents are unbalanced with regard to their classes.</a:t>
+            </a:r>
             <a:endParaRPr lang="en-US" dirty="0"/>
           </a:p>
         </p:txBody>
@@ -5010,27 +5416,7 @@
           <a:p>
             <a:r>
               <a:rPr lang="en-US" dirty="0"/>
-              <a:t>Max Pooling</a:t>
-            </a:r>
-          </a:p>
-          <a:p>
-            <a:r>
-              <a:rPr lang="en-US" dirty="0"/>
-              <a:t>Visualize filters</a:t>
-            </a:r>
-          </a:p>
-          <a:p>
-            <a:r>
-              <a:rPr lang="en-US" dirty="0"/>
-              <a:t>Fully connected vs conv for </a:t>
-            </a:r>
-            <a:r>
-              <a:rPr lang="en-US" dirty="0" err="1"/>
-              <a:t>mnists</a:t>
-            </a:r>
-            <a:r>
-              <a:rPr lang="en-US" dirty="0"/>
-              <a:t> dataset</a:t>
+              <a:t>Images are just a grid of numbers, and each number tells you how intense a certain pixel is.</a:t>
             </a:r>
           </a:p>
           <a:p>
@@ -5066,6 +5452,36 @@
           </a:p>
         </p:txBody>
       </p:sp>
+      <p:pic>
+        <p:nvPicPr>
+          <p:cNvPr id="6" name="Picture 5">
+            <a:extLst>
+              <a:ext uri="{FF2B5EF4-FFF2-40B4-BE49-F238E27FC236}">
+                <a16:creationId xmlns:a16="http://schemas.microsoft.com/office/drawing/2014/main" id="{8FB6A0F8-6ED4-7C40-97B0-3ABC1B20C306}"/>
+              </a:ext>
+            </a:extLst>
+          </p:cNvPr>
+          <p:cNvPicPr>
+            <a:picLocks noChangeAspect="1"/>
+          </p:cNvPicPr>
+          <p:nvPr/>
+        </p:nvPicPr>
+        <p:blipFill>
+          <a:blip r:embed="rId3"/>
+          <a:stretch>
+            <a:fillRect/>
+          </a:stretch>
+        </p:blipFill>
+        <p:spPr>
+          <a:xfrm>
+            <a:off x="3343965" y="2734956"/>
+            <a:ext cx="5504069" cy="3986519"/>
+          </a:xfrm>
+          <a:prstGeom prst="rect">
+            <a:avLst/>
+          </a:prstGeom>
+        </p:spPr>
+      </p:pic>
     </p:spTree>
     <p:extLst>
       <p:ext uri="{BB962C8B-B14F-4D97-AF65-F5344CB8AC3E}">
@@ -5119,7 +5535,7 @@
           <a:p>
             <a:r>
               <a:rPr lang="en-US" dirty="0"/>
-              <a:t>Recurrent Neural Networks</a:t>
+              <a:t>Convolutional Neural Networks</a:t>
             </a:r>
           </a:p>
         </p:txBody>
@@ -5145,11 +5561,11 @@
           <a:bodyPr/>
           <a:lstStyle/>
           <a:p>
+            <a:pPr marL="0" indent="0">
+              <a:buNone/>
+            </a:pPr>
             <a:endParaRPr lang="en-US" dirty="0"/>
           </a:p>
-          <a:p>
-            <a:endParaRPr lang="en-US" dirty="0"/>
-          </a:p>
         </p:txBody>
       </p:sp>
       <p:sp>
@@ -5174,13 +5590,85 @@
           <a:lstStyle/>
           <a:p>
             <a:endParaRPr lang="en-US"/>
+          </a:p>
+        </p:txBody>
+      </p:sp>
+      <p:pic>
+        <p:nvPicPr>
+          <p:cNvPr id="6" name="Picture 5">
+            <a:extLst>
+              <a:ext uri="{FF2B5EF4-FFF2-40B4-BE49-F238E27FC236}">
+                <a16:creationId xmlns:a16="http://schemas.microsoft.com/office/drawing/2014/main" id="{8FB6A0F8-6ED4-7C40-97B0-3ABC1B20C306}"/>
+              </a:ext>
+            </a:extLst>
+          </p:cNvPr>
+          <p:cNvPicPr>
+            <a:picLocks noChangeAspect="1"/>
+          </p:cNvPicPr>
+          <p:nvPr/>
+        </p:nvPicPr>
+        <p:blipFill>
+          <a:blip r:embed="rId3"/>
+          <a:srcRect/>
+          <a:stretch/>
+        </p:blipFill>
+        <p:spPr>
+          <a:xfrm>
+            <a:off x="1774687" y="2431485"/>
+            <a:ext cx="8963491" cy="3139617"/>
+          </a:xfrm>
+          <a:prstGeom prst="rect">
+            <a:avLst/>
+          </a:prstGeom>
+        </p:spPr>
+      </p:pic>
+      <p:sp>
+        <p:nvSpPr>
+          <p:cNvPr id="7" name="TextBox 6">
+            <a:extLst>
+              <a:ext uri="{FF2B5EF4-FFF2-40B4-BE49-F238E27FC236}">
+                <a16:creationId xmlns:a16="http://schemas.microsoft.com/office/drawing/2014/main" id="{BBB8C189-4C26-A043-8C63-2A2B66867F21}"/>
+              </a:ext>
+            </a:extLst>
+          </p:cNvPr>
+          <p:cNvSpPr txBox="1"/>
+          <p:nvPr/>
+        </p:nvSpPr>
+        <p:spPr>
+          <a:xfrm>
+            <a:off x="3772675" y="5701244"/>
+            <a:ext cx="4967514" cy="307777"/>
+          </a:xfrm>
+          <a:prstGeom prst="rect">
+            <a:avLst/>
+          </a:prstGeom>
+          <a:noFill/>
+        </p:spPr>
+        <p:txBody>
+          <a:bodyPr wrap="none" rtlCol="0">
+            <a:spAutoFit/>
+          </a:bodyPr>
+          <a:lstStyle/>
+          <a:p>
+            <a:r>
+              <a:rPr lang="en-US" sz="1400" dirty="0"/>
+              <a:t>https://</a:t>
+            </a:r>
+            <a:r>
+              <a:rPr lang="en-US" sz="1400" dirty="0" err="1"/>
+              <a:t>ujjwalkarn.me</a:t>
+            </a:r>
+            <a:r>
+              <a:rPr lang="en-US" sz="1400" dirty="0"/>
+              <a:t>/2016/08/11/intuitive-explanation-convnets/</a:t>
+            </a:r>
           </a:p>
         </p:txBody>
       </p:sp>
     </p:spTree>
     <p:extLst>
       <p:ext uri="{BB962C8B-B14F-4D97-AF65-F5344CB8AC3E}">
-        <p14:creationId xmlns:p14="http://schemas.microsoft.com/office/powerpoint/2010/main" val="2468568533"/>
+        <p14:creationId xmlns:p14="http://schemas.microsoft.com/office/powerpoint/2010/main" val="2189248876"/>
       </p:ext>
     </p:extLst>
   </p:cSld>
@@ -5230,7 +5718,7 @@
           <a:p>
             <a:r>
               <a:rPr lang="en-US" dirty="0"/>
-              <a:t>Transfer Learning with CNN</a:t>
+              <a:t>Transfer Learning</a:t>
             </a:r>
           </a:p>
         </p:txBody>
@@ -5288,6 +5776,266 @@
           </a:p>
         </p:txBody>
       </p:sp>
+      <p:sp>
+        <p:nvSpPr>
+          <p:cNvPr id="5" name="Content Placeholder 2">
+            <a:extLst>
+              <a:ext uri="{FF2B5EF4-FFF2-40B4-BE49-F238E27FC236}">
+                <a16:creationId xmlns:a16="http://schemas.microsoft.com/office/drawing/2014/main" id="{95511CA2-B533-484B-BB6D-BD44FEB692DB}"/>
+              </a:ext>
+            </a:extLst>
+          </p:cNvPr>
+          <p:cNvSpPr txBox="1">
+            <a:spLocks/>
+          </p:cNvSpPr>
+          <p:nvPr/>
+        </p:nvSpPr>
+        <p:spPr>
+          <a:xfrm>
+            <a:off x="990600" y="1978025"/>
+            <a:ext cx="10515600" cy="4351338"/>
+          </a:xfrm>
+          <a:prstGeom prst="rect">
+            <a:avLst/>
+          </a:prstGeom>
+        </p:spPr>
+        <p:txBody>
+          <a:bodyPr vert="horz" lIns="91440" tIns="45720" rIns="91440" bIns="45720" rtlCol="0">
+            <a:normAutofit/>
+          </a:bodyPr>
+          <a:lstStyle>
+            <a:lvl1pPr marL="228600" indent="-228600" algn="l" defTabSz="914400" rtl="0" eaLnBrk="1" latinLnBrk="0" hangingPunct="1">
+              <a:lnSpc>
+                <a:spcPct val="90000"/>
+              </a:lnSpc>
+              <a:spcBef>
+                <a:spcPts val="1000"/>
+              </a:spcBef>
+              <a:buFont typeface="Arial" panose="020B0604020202020204" pitchFamily="34" charset="0"/>
+              <a:buChar char="•"/>
+              <a:defRPr sz="2800" kern="1200">
+                <a:solidFill>
+                  <a:schemeClr val="tx1"/>
+                </a:solidFill>
+                <a:latin typeface="+mn-lt"/>
+                <a:ea typeface="+mn-ea"/>
+                <a:cs typeface="+mn-cs"/>
+              </a:defRPr>
+            </a:lvl1pPr>
+            <a:lvl2pPr marL="685800" indent="-228600" algn="l" defTabSz="914400" rtl="0" eaLnBrk="1" latinLnBrk="0" hangingPunct="1">
+              <a:lnSpc>
+                <a:spcPct val="90000"/>
+              </a:lnSpc>
+              <a:spcBef>
+                <a:spcPts val="500"/>
+              </a:spcBef>
+              <a:buFont typeface="Arial" panose="020B0604020202020204" pitchFamily="34" charset="0"/>
+              <a:buChar char="•"/>
+              <a:defRPr sz="2400" kern="1200">
+                <a:solidFill>
+                  <a:schemeClr val="tx1"/>
+                </a:solidFill>
+                <a:latin typeface="+mn-lt"/>
+                <a:ea typeface="+mn-ea"/>
+                <a:cs typeface="+mn-cs"/>
+              </a:defRPr>
+            </a:lvl2pPr>
+            <a:lvl3pPr marL="1143000" indent="-228600" algn="l" defTabSz="914400" rtl="0" eaLnBrk="1" latinLnBrk="0" hangingPunct="1">
+              <a:lnSpc>
+                <a:spcPct val="90000"/>
+              </a:lnSpc>
+              <a:spcBef>
+                <a:spcPts val="500"/>
+              </a:spcBef>
+              <a:buFont typeface="Arial" panose="020B0604020202020204" pitchFamily="34" charset="0"/>
+              <a:buChar char="•"/>
+              <a:defRPr sz="2000" kern="1200">
+                <a:solidFill>
+                  <a:schemeClr val="tx1"/>
+                </a:solidFill>
+                <a:latin typeface="+mn-lt"/>
+                <a:ea typeface="+mn-ea"/>
+                <a:cs typeface="+mn-cs"/>
+              </a:defRPr>
+            </a:lvl3pPr>
+            <a:lvl4pPr marL="1600200" indent="-228600" algn="l" defTabSz="914400" rtl="0" eaLnBrk="1" latinLnBrk="0" hangingPunct="1">
+              <a:lnSpc>
+                <a:spcPct val="90000"/>
+              </a:lnSpc>
+              <a:spcBef>
+                <a:spcPts val="500"/>
+              </a:spcBef>
+              <a:buFont typeface="Arial" panose="020B0604020202020204" pitchFamily="34" charset="0"/>
+              <a:buChar char="•"/>
+              <a:defRPr sz="1800" kern="1200">
+                <a:solidFill>
+                  <a:schemeClr val="tx1"/>
+                </a:solidFill>
+                <a:latin typeface="+mn-lt"/>
+                <a:ea typeface="+mn-ea"/>
+                <a:cs typeface="+mn-cs"/>
+              </a:defRPr>
+            </a:lvl4pPr>
+            <a:lvl5pPr marL="2057400" indent="-228600" algn="l" defTabSz="914400" rtl="0" eaLnBrk="1" latinLnBrk="0" hangingPunct="1">
+              <a:lnSpc>
+                <a:spcPct val="90000"/>
+              </a:lnSpc>
+              <a:spcBef>
+                <a:spcPts val="500"/>
+              </a:spcBef>
+              <a:buFont typeface="Arial" panose="020B0604020202020204" pitchFamily="34" charset="0"/>
+              <a:buChar char="•"/>
+              <a:defRPr sz="1800" kern="1200">
+                <a:solidFill>
+                  <a:schemeClr val="tx1"/>
+                </a:solidFill>
+                <a:latin typeface="+mn-lt"/>
+                <a:ea typeface="+mn-ea"/>
+                <a:cs typeface="+mn-cs"/>
+              </a:defRPr>
+            </a:lvl5pPr>
+            <a:lvl6pPr marL="2514600" indent="-228600" algn="l" defTabSz="914400" rtl="0" eaLnBrk="1" latinLnBrk="0" hangingPunct="1">
+              <a:lnSpc>
+                <a:spcPct val="90000"/>
+              </a:lnSpc>
+              <a:spcBef>
+                <a:spcPts val="500"/>
+              </a:spcBef>
+              <a:buFont typeface="Arial" panose="020B0604020202020204" pitchFamily="34" charset="0"/>
+              <a:buChar char="•"/>
+              <a:defRPr sz="1800" kern="1200">
+                <a:solidFill>
+                  <a:schemeClr val="tx1"/>
+                </a:solidFill>
+                <a:latin typeface="+mn-lt"/>
+                <a:ea typeface="+mn-ea"/>
+                <a:cs typeface="+mn-cs"/>
+              </a:defRPr>
+            </a:lvl6pPr>
+            <a:lvl7pPr marL="2971800" indent="-228600" algn="l" defTabSz="914400" rtl="0" eaLnBrk="1" latinLnBrk="0" hangingPunct="1">
+              <a:lnSpc>
+                <a:spcPct val="90000"/>
+              </a:lnSpc>
+              <a:spcBef>
+                <a:spcPts val="500"/>
+              </a:spcBef>
+              <a:buFont typeface="Arial" panose="020B0604020202020204" pitchFamily="34" charset="0"/>
+              <a:buChar char="•"/>
+              <a:defRPr sz="1800" kern="1200">
+                <a:solidFill>
+                  <a:schemeClr val="tx1"/>
+                </a:solidFill>
+                <a:latin typeface="+mn-lt"/>
+                <a:ea typeface="+mn-ea"/>
+                <a:cs typeface="+mn-cs"/>
+              </a:defRPr>
+            </a:lvl7pPr>
+            <a:lvl8pPr marL="3429000" indent="-228600" algn="l" defTabSz="914400" rtl="0" eaLnBrk="1" latinLnBrk="0" hangingPunct="1">
+              <a:lnSpc>
+                <a:spcPct val="90000"/>
+              </a:lnSpc>
+              <a:spcBef>
+                <a:spcPts val="500"/>
+              </a:spcBef>
+              <a:buFont typeface="Arial" panose="020B0604020202020204" pitchFamily="34" charset="0"/>
+              <a:buChar char="•"/>
+              <a:defRPr sz="1800" kern="1200">
+                <a:solidFill>
+                  <a:schemeClr val="tx1"/>
+                </a:solidFill>
+                <a:latin typeface="+mn-lt"/>
+                <a:ea typeface="+mn-ea"/>
+                <a:cs typeface="+mn-cs"/>
+              </a:defRPr>
+            </a:lvl8pPr>
+            <a:lvl9pPr marL="3886200" indent="-228600" algn="l" defTabSz="914400" rtl="0" eaLnBrk="1" latinLnBrk="0" hangingPunct="1">
+              <a:lnSpc>
+                <a:spcPct val="90000"/>
+              </a:lnSpc>
+              <a:spcBef>
+                <a:spcPts val="500"/>
+              </a:spcBef>
+              <a:buFont typeface="Arial" panose="020B0604020202020204" pitchFamily="34" charset="0"/>
+              <a:buChar char="•"/>
+              <a:defRPr sz="1800" kern="1200">
+                <a:solidFill>
+                  <a:schemeClr val="tx1"/>
+                </a:solidFill>
+                <a:latin typeface="+mn-lt"/>
+                <a:ea typeface="+mn-ea"/>
+                <a:cs typeface="+mn-cs"/>
+              </a:defRPr>
+            </a:lvl9pPr>
+          </a:lstStyle>
+          <a:p>
+            <a:r>
+              <a:rPr lang="en-US" dirty="0"/>
+              <a:t>A pre-trained model is used as the starting point for another “related” task</a:t>
+            </a:r>
+          </a:p>
+          <a:p>
+            <a:r>
+              <a:rPr lang="en-US" dirty="0"/>
+              <a:t>You can fine-tune a pre-trained model from</a:t>
+            </a:r>
+          </a:p>
+          <a:p>
+            <a:pPr marL="0" indent="0">
+              <a:buNone/>
+            </a:pPr>
+            <a:r>
+              <a:rPr lang="en-US" dirty="0"/>
+              <a:t>a model zoo (VGG, </a:t>
+            </a:r>
+            <a:r>
+              <a:rPr lang="en-US" dirty="0" err="1"/>
+              <a:t>ReseNet</a:t>
+            </a:r>
+            <a:r>
+              <a:rPr lang="en-US" dirty="0"/>
+              <a:t>, BERT, </a:t>
+            </a:r>
+            <a:r>
+              <a:rPr lang="en-US" dirty="0" err="1"/>
+              <a:t>etc</a:t>
+            </a:r>
+            <a:r>
+              <a:rPr lang="en-US" dirty="0"/>
+              <a:t>)</a:t>
+            </a:r>
+          </a:p>
+        </p:txBody>
+      </p:sp>
+      <p:pic>
+        <p:nvPicPr>
+          <p:cNvPr id="8" name="Picture 7">
+            <a:extLst>
+              <a:ext uri="{FF2B5EF4-FFF2-40B4-BE49-F238E27FC236}">
+                <a16:creationId xmlns:a16="http://schemas.microsoft.com/office/drawing/2014/main" id="{5D6B6DAE-9FDA-5542-8DC9-AF630DC4D5FD}"/>
+              </a:ext>
+            </a:extLst>
+          </p:cNvPr>
+          <p:cNvPicPr>
+            <a:picLocks noChangeAspect="1"/>
+          </p:cNvPicPr>
+          <p:nvPr/>
+        </p:nvPicPr>
+        <p:blipFill>
+          <a:blip r:embed="rId3"/>
+          <a:stretch>
+            <a:fillRect/>
+          </a:stretch>
+        </p:blipFill>
+        <p:spPr>
+          <a:xfrm>
+            <a:off x="7748702" y="2517878"/>
+            <a:ext cx="3909898" cy="3916017"/>
+          </a:xfrm>
+          <a:prstGeom prst="rect">
+            <a:avLst/>
+          </a:prstGeom>
+        </p:spPr>
+      </p:pic>
     </p:spTree>
     <p:extLst>
       <p:ext uri="{BB962C8B-B14F-4D97-AF65-F5344CB8AC3E}">

</xml_diff>